<commit_message>
change font(to calibri), icon.
</commit_message>
<xml_diff>
--- a/GenomonPipeline.pptx
+++ b/GenomonPipeline.pptx
@@ -195,7 +195,7 @@
           <a:p>
             <a:fld id="{CB483EFB-F0DD-4A29-AFA5-ECBBEE494D40}" type="datetimeFigureOut">
               <a:rPr kumimoji="1" lang="ja-JP" altLang="en-US" smtClean="0"/>
-              <a:t>15/10/06</a:t>
+              <a:t>2015/10/6</a:t>
             </a:fld>
             <a:endParaRPr kumimoji="1" lang="ja-JP" altLang="en-US"/>
           </a:p>
@@ -360,7 +360,7 @@
           <a:p>
             <a:fld id="{DC582AAB-712C-45D4-8745-44516254F3BE}" type="datetimeFigureOut">
               <a:rPr kumimoji="1" lang="ja-JP" altLang="en-US" smtClean="0"/>
-              <a:t>15/10/06</a:t>
+              <a:t>2015/10/6</a:t>
             </a:fld>
             <a:endParaRPr kumimoji="1" lang="ja-JP" altLang="en-US"/>
           </a:p>
@@ -925,7 +925,7 @@
           <a:p>
             <a:fld id="{E90ED720-0104-4369-84BC-D37694168613}" type="datetimeFigureOut">
               <a:rPr kumimoji="1" lang="ja-JP" altLang="en-US" smtClean="0"/>
-              <a:t>15/10/06</a:t>
+              <a:t>2015/10/6</a:t>
             </a:fld>
             <a:endParaRPr kumimoji="1" lang="ja-JP" altLang="en-US"/>
           </a:p>
@@ -1122,7 +1122,7 @@
           <a:p>
             <a:fld id="{E90ED720-0104-4369-84BC-D37694168613}" type="datetimeFigureOut">
               <a:rPr kumimoji="1" lang="ja-JP" altLang="en-US" smtClean="0"/>
-              <a:t>15/10/06</a:t>
+              <a:t>2015/10/6</a:t>
             </a:fld>
             <a:endParaRPr kumimoji="1" lang="ja-JP" altLang="en-US"/>
           </a:p>
@@ -1329,7 +1329,7 @@
           <a:p>
             <a:fld id="{E90ED720-0104-4369-84BC-D37694168613}" type="datetimeFigureOut">
               <a:rPr kumimoji="1" lang="ja-JP" altLang="en-US" smtClean="0"/>
-              <a:t>15/10/06</a:t>
+              <a:t>2015/10/6</a:t>
             </a:fld>
             <a:endParaRPr kumimoji="1" lang="ja-JP" altLang="en-US"/>
           </a:p>
@@ -1526,7 +1526,7 @@
           <a:p>
             <a:fld id="{E90ED720-0104-4369-84BC-D37694168613}" type="datetimeFigureOut">
               <a:rPr kumimoji="1" lang="ja-JP" altLang="en-US" smtClean="0"/>
-              <a:t>15/10/06</a:t>
+              <a:t>2015/10/6</a:t>
             </a:fld>
             <a:endParaRPr kumimoji="1" lang="ja-JP" altLang="en-US"/>
           </a:p>
@@ -1767,7 +1767,7 @@
           <a:p>
             <a:fld id="{E90ED720-0104-4369-84BC-D37694168613}" type="datetimeFigureOut">
               <a:rPr kumimoji="1" lang="ja-JP" altLang="en-US" smtClean="0"/>
-              <a:t>15/10/06</a:t>
+              <a:t>2015/10/6</a:t>
             </a:fld>
             <a:endParaRPr kumimoji="1" lang="ja-JP" altLang="en-US"/>
           </a:p>
@@ -2114,7 +2114,7 @@
           <a:p>
             <a:fld id="{E90ED720-0104-4369-84BC-D37694168613}" type="datetimeFigureOut">
               <a:rPr kumimoji="1" lang="ja-JP" altLang="en-US" smtClean="0"/>
-              <a:t>15/10/06</a:t>
+              <a:t>2015/10/6</a:t>
             </a:fld>
             <a:endParaRPr kumimoji="1" lang="ja-JP" altLang="en-US"/>
           </a:p>
@@ -2595,7 +2595,7 @@
           <a:p>
             <a:fld id="{E90ED720-0104-4369-84BC-D37694168613}" type="datetimeFigureOut">
               <a:rPr kumimoji="1" lang="ja-JP" altLang="en-US" smtClean="0"/>
-              <a:t>15/10/06</a:t>
+              <a:t>2015/10/6</a:t>
             </a:fld>
             <a:endParaRPr kumimoji="1" lang="ja-JP" altLang="en-US"/>
           </a:p>
@@ -2708,7 +2708,7 @@
           <a:p>
             <a:fld id="{E90ED720-0104-4369-84BC-D37694168613}" type="datetimeFigureOut">
               <a:rPr kumimoji="1" lang="ja-JP" altLang="en-US" smtClean="0"/>
-              <a:t>15/10/06</a:t>
+              <a:t>2015/10/6</a:t>
             </a:fld>
             <a:endParaRPr kumimoji="1" lang="ja-JP" altLang="en-US"/>
           </a:p>
@@ -2798,7 +2798,7 @@
           <a:p>
             <a:fld id="{E90ED720-0104-4369-84BC-D37694168613}" type="datetimeFigureOut">
               <a:rPr kumimoji="1" lang="ja-JP" altLang="en-US" smtClean="0"/>
-              <a:t>15/10/06</a:t>
+              <a:t>2015/10/6</a:t>
             </a:fld>
             <a:endParaRPr kumimoji="1" lang="ja-JP" altLang="en-US"/>
           </a:p>
@@ -3102,7 +3102,7 @@
           <a:p>
             <a:fld id="{E90ED720-0104-4369-84BC-D37694168613}" type="datetimeFigureOut">
               <a:rPr kumimoji="1" lang="ja-JP" altLang="en-US" smtClean="0"/>
-              <a:t>15/10/06</a:t>
+              <a:t>2015/10/6</a:t>
             </a:fld>
             <a:endParaRPr kumimoji="1" lang="ja-JP" altLang="en-US"/>
           </a:p>
@@ -3350,7 +3350,7 @@
           <a:p>
             <a:fld id="{E90ED720-0104-4369-84BC-D37694168613}" type="datetimeFigureOut">
               <a:rPr kumimoji="1" lang="ja-JP" altLang="en-US" smtClean="0"/>
-              <a:t>15/10/06</a:t>
+              <a:t>2015/10/6</a:t>
             </a:fld>
             <a:endParaRPr kumimoji="1" lang="ja-JP" altLang="en-US"/>
           </a:p>
@@ -3590,7 +3590,7 @@
           <a:p>
             <a:fld id="{E90ED720-0104-4369-84BC-D37694168613}" type="datetimeFigureOut">
               <a:rPr kumimoji="1" lang="ja-JP" altLang="en-US" smtClean="0"/>
-              <a:t>15/10/06</a:t>
+              <a:t>2015/10/6</a:t>
             </a:fld>
             <a:endParaRPr kumimoji="1" lang="ja-JP" altLang="en-US"/>
           </a:p>
@@ -3960,6 +3960,36 @@
           <a:chExt cx="0" cy="0"/>
         </a:xfrm>
       </p:grpSpPr>
+      <p:pic>
+        <p:nvPicPr>
+          <p:cNvPr id="2" name="図 1" descr="genomon.png"/>
+          <p:cNvPicPr>
+            <a:picLocks noChangeAspect="1"/>
+          </p:cNvPicPr>
+          <p:nvPr/>
+        </p:nvPicPr>
+        <p:blipFill>
+          <a:blip r:embed="rId3">
+            <a:extLst>
+              <a:ext uri="{28A0092B-C50C-407E-A947-70E740481C1C}">
+                <a14:useLocalDpi xmlns:a14="http://schemas.microsoft.com/office/drawing/2010/main" val="0"/>
+              </a:ext>
+            </a:extLst>
+          </a:blip>
+          <a:stretch>
+            <a:fillRect/>
+          </a:stretch>
+        </p:blipFill>
+        <p:spPr>
+          <a:xfrm>
+            <a:off x="10796493" y="4752853"/>
+            <a:ext cx="20852727" cy="10873208"/>
+          </a:xfrm>
+          <a:prstGeom prst="rect">
+            <a:avLst/>
+          </a:prstGeom>
+        </p:spPr>
+      </p:pic>
       <p:sp>
         <p:nvSpPr>
           <p:cNvPr id="16" name="正方形/長方形 15"/>
@@ -4021,8 +4051,8 @@
         </p:nvSpPr>
         <p:spPr>
           <a:xfrm>
-            <a:off x="21602625" y="16994213"/>
-            <a:ext cx="9001000" cy="7416824"/>
+            <a:off x="21710637" y="16339625"/>
+            <a:ext cx="9001000" cy="7207315"/>
           </a:xfrm>
           <a:prstGeom prst="rect">
             <a:avLst/>
@@ -4069,8 +4099,8 @@
         </p:nvSpPr>
         <p:spPr>
           <a:xfrm>
-            <a:off x="11521505" y="16994213"/>
-            <a:ext cx="9001000" cy="7416824"/>
+            <a:off x="11521505" y="16339625"/>
+            <a:ext cx="9001000" cy="7207315"/>
           </a:xfrm>
           <a:prstGeom prst="rect">
             <a:avLst/>
@@ -4117,8 +4147,8 @@
         </p:nvSpPr>
         <p:spPr>
           <a:xfrm>
-            <a:off x="1152353" y="16994213"/>
-            <a:ext cx="9001000" cy="7416824"/>
+            <a:off x="1332373" y="16339625"/>
+            <a:ext cx="9001000" cy="7207315"/>
           </a:xfrm>
           <a:prstGeom prst="rect">
             <a:avLst/>
@@ -4166,7 +4196,7 @@
         <p:spPr>
           <a:xfrm>
             <a:off x="-224" y="0"/>
-            <a:ext cx="32404274" cy="4752853"/>
+            <a:ext cx="32404274" cy="5328917"/>
           </a:xfrm>
           <a:prstGeom prst="rect">
             <a:avLst/>
@@ -4263,7 +4293,6 @@
               <a:solidFill>
                 <a:schemeClr val="bg1"/>
               </a:solidFill>
-              <a:latin typeface="Plantagenet Cherokee" pitchFamily="18" charset="0"/>
             </a:endParaRPr>
           </a:p>
         </p:txBody>
@@ -4303,23 +4332,7 @@
                   <a:srgbClr val="FFFFFF"/>
                 </a:solidFill>
               </a:rPr>
-              <a:t> </a:t>
-            </a:r>
-            <a:r>
-              <a:rPr lang="en-US" altLang="ja-JP" sz="3200" dirty="0" smtClean="0">
-                <a:solidFill>
-                  <a:srgbClr val="FFFFFF"/>
-                </a:solidFill>
-              </a:rPr>
-              <a:t>Shimizu(1), Kenichi Chiba(1), </a:t>
-            </a:r>
-            <a:r>
-              <a:rPr lang="en-US" altLang="ja-JP" sz="3200" dirty="0" smtClean="0">
-                <a:solidFill>
-                  <a:srgbClr val="FFFFFF"/>
-                </a:solidFill>
-              </a:rPr>
-              <a:t>Yuichi </a:t>
+              <a:t> Shimizu(1), Kenichi Chiba(1), Yuichi </a:t>
             </a:r>
             <a:r>
               <a:rPr lang="en-US" altLang="ja-JP" sz="3200" dirty="0" err="1">
@@ -4343,15 +4356,7 @@
                   <a:srgbClr val="FFFFFF"/>
                 </a:solidFill>
               </a:rPr>
-              <a:t>),</a:t>
-            </a:r>
-            <a:r>
-              <a:rPr lang="en-US" altLang="ja-JP" sz="3200" dirty="0" smtClean="0">
-                <a:solidFill>
-                  <a:srgbClr val="FFFFFF"/>
-                </a:solidFill>
-              </a:rPr>
-              <a:t> Mitsuhiro Komura(1), Hiroko Tanaka, Satoshi Ito, </a:t>
+              <a:t>), Mitsuhiro Komura(1), Hiroko Tanaka, Satoshi Ito, </a:t>
             </a:r>
             <a:r>
               <a:rPr lang="en-US" altLang="ja-JP" sz="3200" dirty="0" err="1" smtClean="0">
@@ -4453,7 +4458,6 @@
               <a:solidFill>
                 <a:srgbClr val="FFFFFF"/>
               </a:solidFill>
-              <a:latin typeface="Plantagenet Cherokee" pitchFamily="18" charset="0"/>
               <a:ea typeface="ＭＳ Ｐゴシック" pitchFamily="50" charset="-128"/>
               <a:cs typeface="Arial" pitchFamily="34" charset="0"/>
             </a:endParaRPr>
@@ -4493,12 +4497,6 @@
               </a:rPr>
               <a:t>Genomon</a:t>
             </a:r>
-            <a:endParaRPr lang="en-US" altLang="ja-JP" sz="12000" b="1" dirty="0" smtClean="0">
-              <a:solidFill>
-                <a:schemeClr val="bg1"/>
-              </a:solidFill>
-              <a:latin typeface="Plantagenet Cherokee" pitchFamily="18" charset="0"/>
-            </a:endParaRPr>
           </a:p>
         </p:txBody>
       </p:sp>
@@ -4510,14 +4508,17 @@
         </p:nvSpPr>
         <p:spPr>
           <a:xfrm>
-            <a:off x="216249" y="24699069"/>
+            <a:off x="216249" y="24257990"/>
             <a:ext cx="15626257" cy="873127"/>
           </a:xfrm>
           <a:prstGeom prst="roundRect">
             <a:avLst/>
           </a:prstGeom>
           <a:solidFill>
-            <a:schemeClr val="tx1"/>
+            <a:schemeClr val="tx1">
+              <a:lumMod val="95000"/>
+              <a:lumOff val="5000"/>
+            </a:schemeClr>
           </a:solidFill>
           <a:ln>
             <a:solidFill>
@@ -4549,7 +4550,7 @@
                 <a:solidFill>
                   <a:schemeClr val="bg1"/>
                 </a:solidFill>
-                <a:latin typeface="Plantagenet Cherokee"/>
+                <a:latin typeface="+mj-lt"/>
                 <a:cs typeface="Plantagenet Cherokee"/>
               </a:rPr>
               <a:t>DNA sequence analysis pipeline</a:t>
@@ -4558,7 +4559,7 @@
               <a:solidFill>
                 <a:schemeClr val="bg1"/>
               </a:solidFill>
-              <a:latin typeface="Plantagenet Cherokee"/>
+              <a:latin typeface="+mj-lt"/>
               <a:cs typeface="Plantagenet Cherokee"/>
             </a:endParaRPr>
           </a:p>
@@ -4669,7 +4670,7 @@
         </p:nvSpPr>
         <p:spPr>
           <a:xfrm>
-            <a:off x="792313" y="36580389"/>
+            <a:off x="792313" y="36436373"/>
             <a:ext cx="14473608" cy="4401205"/>
           </a:xfrm>
           <a:prstGeom prst="rect">
@@ -4699,7 +4700,6 @@
               <a:rPr lang="en-US" altLang="ja-JP" sz="4000" dirty="0" smtClean="0"/>
               <a:t> files.</a:t>
             </a:r>
-            <a:endParaRPr lang="en-US" altLang="ja-JP" sz="4000" dirty="0" smtClean="0"/>
           </a:p>
           <a:p>
             <a:pPr marL="457200" indent="-457200">
@@ -4708,11 +4708,7 @@
             </a:pPr>
             <a:r>
               <a:rPr lang="en-US" altLang="ja-JP" sz="4000" dirty="0" smtClean="0"/>
-              <a:t>Suitable </a:t>
-            </a:r>
-            <a:r>
-              <a:rPr lang="en-US" altLang="ja-JP" sz="4000" dirty="0" smtClean="0"/>
-              <a:t>for whole genome sequencing analysis (as well as </a:t>
+              <a:t>Suitable for whole genome sequencing analysis (as well as </a:t>
             </a:r>
             <a:r>
               <a:rPr lang="en-US" altLang="ja-JP" sz="4000" dirty="0" err="1" smtClean="0"/>
@@ -4756,46 +4752,11 @@
             </a:r>
             <a:r>
               <a:rPr lang="en-US" altLang="en-US" sz="4000" dirty="0" smtClean="0"/>
-              <a:t> (10bp – 1000bp) such as FLT3-ITD as well as long range structural variations</a:t>
-            </a:r>
-            <a:r>
-              <a:rPr lang="en-US" altLang="en-US" sz="4000" dirty="0" smtClean="0"/>
-              <a:t>.</a:t>
-            </a:r>
-            <a:endParaRPr lang="en-US" altLang="en-US" sz="4000" dirty="0" smtClean="0"/>
-          </a:p>
-        </p:txBody>
-      </p:sp>
-      <p:pic>
-        <p:nvPicPr>
-          <p:cNvPr id="2" name="図 1" descr="genomon.png"/>
-          <p:cNvPicPr>
-            <a:picLocks noChangeAspect="1"/>
-          </p:cNvPicPr>
-          <p:nvPr/>
-        </p:nvPicPr>
-        <p:blipFill>
-          <a:blip r:embed="rId3">
-            <a:extLst>
-              <a:ext uri="{28A0092B-C50C-407E-A947-70E740481C1C}">
-                <a14:useLocalDpi xmlns:a14="http://schemas.microsoft.com/office/drawing/2010/main" val="0"/>
-              </a:ext>
-            </a:extLst>
-          </a:blip>
-          <a:stretch>
-            <a:fillRect/>
-          </a:stretch>
-        </p:blipFill>
-        <p:spPr>
-          <a:xfrm>
-            <a:off x="9001225" y="4752853"/>
-            <a:ext cx="22647995" cy="11809312"/>
-          </a:xfrm>
-          <a:prstGeom prst="rect">
-            <a:avLst/>
-          </a:prstGeom>
-        </p:spPr>
-      </p:pic>
+              <a:t> (10bp – 1000bp) such as FLT3-ITD as well as long range structural variations.</a:t>
+            </a:r>
+          </a:p>
+        </p:txBody>
+      </p:sp>
       <p:sp>
         <p:nvSpPr>
           <p:cNvPr id="3" name="テキスト ボックス 2"/>
@@ -4804,7 +4765,7 @@
         </p:nvSpPr>
         <p:spPr>
           <a:xfrm>
-            <a:off x="3888657" y="19802525"/>
+            <a:off x="4032673" y="19095219"/>
             <a:ext cx="3600400" cy="923330"/>
           </a:xfrm>
           <a:prstGeom prst="rect">
@@ -4818,6 +4779,7 @@
           </a:bodyPr>
           <a:lstStyle/>
           <a:p>
+            <a:pPr algn="ctr"/>
             <a:r>
               <a:rPr lang="en-US" altLang="ja-JP" sz="5400" dirty="0" smtClean="0"/>
               <a:t>Easy to use!</a:t>
@@ -4833,8 +4795,8 @@
         </p:nvSpPr>
         <p:spPr>
           <a:xfrm>
-            <a:off x="1368377" y="21242685"/>
-            <a:ext cx="9001000" cy="2492990"/>
+            <a:off x="1476389" y="20090557"/>
+            <a:ext cx="8748972" cy="1938992"/>
           </a:xfrm>
           <a:prstGeom prst="rect">
             <a:avLst/>
@@ -4857,40 +4819,6 @@
               <a:rPr lang="en-US" altLang="ja-JP" sz="4000" dirty="0" smtClean="0"/>
               <a:t>Your need to prepare the path of input files and just type:</a:t>
             </a:r>
-          </a:p>
-          <a:p>
-            <a:r>
-              <a:rPr lang="en-US" altLang="ja-JP" sz="3600" dirty="0" err="1"/>
-              <a:t>g</a:t>
-            </a:r>
-            <a:r>
-              <a:rPr lang="en-US" altLang="ja-JP" sz="3600" dirty="0" err="1" smtClean="0"/>
-              <a:t>enomon_pipeline</a:t>
-            </a:r>
-            <a:r>
-              <a:rPr lang="en-US" altLang="ja-JP" sz="3600" dirty="0" smtClean="0"/>
-              <a:t> </a:t>
-            </a:r>
-            <a:r>
-              <a:rPr lang="en-US" altLang="ja-JP" sz="3600" dirty="0" err="1" smtClean="0"/>
-              <a:t>dna</a:t>
-            </a:r>
-            <a:r>
-              <a:rPr lang="en-US" altLang="ja-JP" sz="3600" dirty="0" smtClean="0"/>
-              <a:t> </a:t>
-            </a:r>
-            <a:r>
-              <a:rPr lang="en-US" altLang="ja-JP" sz="3600" dirty="0" err="1" smtClean="0"/>
-              <a:t>input.csv</a:t>
-            </a:r>
-            <a:r>
-              <a:rPr lang="en-US" altLang="ja-JP" sz="3600" dirty="0" smtClean="0"/>
-              <a:t> </a:t>
-            </a:r>
-            <a:r>
-              <a:rPr lang="en-US" altLang="ja-JP" sz="3600" dirty="0" err="1" smtClean="0"/>
-              <a:t>output_dir</a:t>
-            </a:r>
             <a:endParaRPr kumimoji="1" lang="ja-JP" altLang="en-US" sz="3600" dirty="0"/>
           </a:p>
         </p:txBody>
@@ -4903,7 +4831,7 @@
         </p:nvSpPr>
         <p:spPr>
           <a:xfrm>
-            <a:off x="13249697" y="19802525"/>
+            <a:off x="13069677" y="19095219"/>
             <a:ext cx="5976664" cy="923330"/>
           </a:xfrm>
           <a:prstGeom prst="rect">
@@ -4917,6 +4845,7 @@
           </a:bodyPr>
           <a:lstStyle/>
           <a:p>
+            <a:pPr algn="ctr"/>
             <a:r>
               <a:rPr lang="en-US" altLang="ja-JP" sz="5400" dirty="0" smtClean="0"/>
               <a:t>Large scale analysis!</a:t>
@@ -4932,7 +4861,7 @@
         </p:nvSpPr>
         <p:spPr>
           <a:xfrm>
-            <a:off x="24626961" y="19802525"/>
+            <a:off x="24752975" y="19095219"/>
             <a:ext cx="3024336" cy="923330"/>
           </a:xfrm>
           <a:prstGeom prst="rect">
@@ -4946,15 +4875,11 @@
           </a:bodyPr>
           <a:lstStyle/>
           <a:p>
+            <a:pPr algn="ctr"/>
             <a:r>
               <a:rPr lang="en-US" altLang="ja-JP" sz="5400" dirty="0" smtClean="0"/>
-              <a:t>Flexible</a:t>
-            </a:r>
-            <a:r>
-              <a:rPr lang="en-US" altLang="ja-JP" sz="5400" dirty="0" smtClean="0"/>
-              <a:t>!</a:t>
-            </a:r>
-            <a:endParaRPr lang="en-US" altLang="ja-JP" sz="5400" dirty="0" smtClean="0"/>
+              <a:t>Flexible!</a:t>
+            </a:r>
           </a:p>
         </p:txBody>
       </p:sp>
@@ -5044,14 +4969,17 @@
         </p:nvSpPr>
         <p:spPr>
           <a:xfrm>
-            <a:off x="16346041" y="24699069"/>
+            <a:off x="16346041" y="24257990"/>
             <a:ext cx="15626257" cy="873127"/>
           </a:xfrm>
           <a:prstGeom prst="roundRect">
             <a:avLst/>
           </a:prstGeom>
           <a:solidFill>
-            <a:schemeClr val="tx1"/>
+            <a:schemeClr val="tx1">
+              <a:lumMod val="95000"/>
+              <a:lumOff val="5000"/>
+            </a:schemeClr>
           </a:solidFill>
           <a:ln>
             <a:solidFill>
@@ -5083,7 +5011,7 @@
                 <a:solidFill>
                   <a:schemeClr val="bg1"/>
                 </a:solidFill>
-                <a:latin typeface="Plantagenet Cherokee"/>
+                <a:latin typeface="+mj-lt"/>
                 <a:cs typeface="Plantagenet Cherokee"/>
               </a:rPr>
               <a:t>RNA sequence analysis pipeline</a:t>
@@ -5092,7 +5020,7 @@
               <a:solidFill>
                 <a:schemeClr val="bg1"/>
               </a:solidFill>
-              <a:latin typeface="Plantagenet Cherokee"/>
+              <a:latin typeface="+mj-lt"/>
               <a:cs typeface="Plantagenet Cherokee"/>
             </a:endParaRPr>
           </a:p>
@@ -5120,7 +5048,7 @@
         </p:blipFill>
         <p:spPr>
           <a:xfrm>
-            <a:off x="1728417" y="25851197"/>
+            <a:off x="1728417" y="25491157"/>
             <a:ext cx="12593560" cy="10585176"/>
           </a:xfrm>
           <a:prstGeom prst="rect">
@@ -5150,7 +5078,7 @@
         </p:blipFill>
         <p:spPr>
           <a:xfrm>
-            <a:off x="17642185" y="25923205"/>
+            <a:off x="17642185" y="25491157"/>
             <a:ext cx="13177033" cy="5760640"/>
           </a:xfrm>
           <a:prstGeom prst="rect">
@@ -5166,7 +5094,7 @@
         </p:nvSpPr>
         <p:spPr>
           <a:xfrm>
-            <a:off x="16634073" y="32259909"/>
+            <a:off x="16634073" y="31971877"/>
             <a:ext cx="7632848" cy="6247864"/>
           </a:xfrm>
           <a:prstGeom prst="rect">
@@ -5250,7 +5178,7 @@
         </p:blipFill>
         <p:spPr>
           <a:xfrm>
-            <a:off x="24122905" y="31611837"/>
+            <a:off x="24122905" y="31323805"/>
             <a:ext cx="8035242" cy="7056784"/>
           </a:xfrm>
           <a:prstGeom prst="rect">
@@ -5273,7 +5201,10 @@
             <a:avLst/>
           </a:prstGeom>
           <a:solidFill>
-            <a:schemeClr val="tx1"/>
+            <a:schemeClr val="tx1">
+              <a:lumMod val="95000"/>
+              <a:lumOff val="5000"/>
+            </a:schemeClr>
           </a:solidFill>
           <a:ln>
             <a:solidFill>
@@ -5305,7 +5236,7 @@
                 <a:solidFill>
                   <a:schemeClr val="bg1"/>
                 </a:solidFill>
-                <a:latin typeface="Plantagenet Cherokee"/>
+                <a:latin typeface="+mj-lt"/>
                 <a:cs typeface="Plantagenet Cherokee"/>
               </a:rPr>
               <a:t>Info</a:t>
@@ -5314,7 +5245,7 @@
               <a:solidFill>
                 <a:schemeClr val="bg1"/>
               </a:solidFill>
-              <a:latin typeface="Plantagenet Cherokee"/>
+              <a:latin typeface="+mj-lt"/>
               <a:cs typeface="Plantagenet Cherokee"/>
             </a:endParaRPr>
           </a:p>
@@ -5388,96 +5319,6 @@
           </a:p>
         </p:txBody>
       </p:sp>
-      <p:pic>
-        <p:nvPicPr>
-          <p:cNvPr id="11" name="図 10" descr="alcohol24.png"/>
-          <p:cNvPicPr>
-            <a:picLocks noChangeAspect="1"/>
-          </p:cNvPicPr>
-          <p:nvPr/>
-        </p:nvPicPr>
-        <p:blipFill>
-          <a:blip r:embed="rId7">
-            <a:extLst>
-              <a:ext uri="{28A0092B-C50C-407E-A947-70E740481C1C}">
-                <a14:useLocalDpi xmlns:a14="http://schemas.microsoft.com/office/drawing/2010/main" val="0"/>
-              </a:ext>
-            </a:extLst>
-          </a:blip>
-          <a:stretch>
-            <a:fillRect/>
-          </a:stretch>
-        </p:blipFill>
-        <p:spPr>
-          <a:xfrm>
-            <a:off x="4608737" y="17642285"/>
-            <a:ext cx="2160240" cy="2160240"/>
-          </a:xfrm>
-          <a:prstGeom prst="rect">
-            <a:avLst/>
-          </a:prstGeom>
-        </p:spPr>
-      </p:pic>
-      <p:pic>
-        <p:nvPicPr>
-          <p:cNvPr id="12" name="図 11" descr="transport196-3.png"/>
-          <p:cNvPicPr>
-            <a:picLocks noChangeAspect="1"/>
-          </p:cNvPicPr>
-          <p:nvPr/>
-        </p:nvPicPr>
-        <p:blipFill>
-          <a:blip r:embed="rId8">
-            <a:extLst>
-              <a:ext uri="{28A0092B-C50C-407E-A947-70E740481C1C}">
-                <a14:useLocalDpi xmlns:a14="http://schemas.microsoft.com/office/drawing/2010/main" val="0"/>
-              </a:ext>
-            </a:extLst>
-          </a:blip>
-          <a:stretch>
-            <a:fillRect/>
-          </a:stretch>
-        </p:blipFill>
-        <p:spPr>
-          <a:xfrm>
-            <a:off x="15121905" y="17930317"/>
-            <a:ext cx="2161555" cy="2161555"/>
-          </a:xfrm>
-          <a:prstGeom prst="rect">
-            <a:avLst/>
-          </a:prstGeom>
-        </p:spPr>
-      </p:pic>
-      <p:pic>
-        <p:nvPicPr>
-          <p:cNvPr id="13" name="図 12" descr="telephone call7.png"/>
-          <p:cNvPicPr>
-            <a:picLocks noChangeAspect="1"/>
-          </p:cNvPicPr>
-          <p:nvPr/>
-        </p:nvPicPr>
-        <p:blipFill>
-          <a:blip r:embed="rId9">
-            <a:extLst>
-              <a:ext uri="{28A0092B-C50C-407E-A947-70E740481C1C}">
-                <a14:useLocalDpi xmlns:a14="http://schemas.microsoft.com/office/drawing/2010/main" val="0"/>
-              </a:ext>
-            </a:extLst>
-          </a:blip>
-          <a:stretch>
-            <a:fillRect/>
-          </a:stretch>
-        </p:blipFill>
-        <p:spPr>
-          <a:xfrm>
-            <a:off x="24842985" y="17570277"/>
-            <a:ext cx="2159840" cy="2159840"/>
-          </a:xfrm>
-          <a:prstGeom prst="rect">
-            <a:avLst/>
-          </a:prstGeom>
-        </p:spPr>
-      </p:pic>
       <p:sp>
         <p:nvSpPr>
           <p:cNvPr id="29" name="テキスト ボックス 28"/>
@@ -5486,8 +5327,8 @@
         </p:nvSpPr>
         <p:spPr>
           <a:xfrm>
-            <a:off x="21674633" y="21098669"/>
-            <a:ext cx="9001000" cy="2554545"/>
+            <a:off x="21890657" y="20090557"/>
+            <a:ext cx="8748972" cy="2554545"/>
           </a:xfrm>
           <a:prstGeom prst="rect">
             <a:avLst/>
@@ -5520,8 +5361,8 @@
         </p:nvSpPr>
         <p:spPr>
           <a:xfrm>
-            <a:off x="11953553" y="21026661"/>
-            <a:ext cx="9073008" cy="3170099"/>
+            <a:off x="11665521" y="20090557"/>
+            <a:ext cx="8748972" cy="3170099"/>
           </a:xfrm>
           <a:prstGeom prst="rect">
             <a:avLst/>
@@ -5834,7 +5675,7 @@
         </p:nvSpPr>
         <p:spPr>
           <a:xfrm>
-            <a:off x="16562065" y="39028661"/>
+            <a:off x="16562065" y="38961877"/>
             <a:ext cx="13105456" cy="1938992"/>
           </a:xfrm>
           <a:prstGeom prst="rect">
@@ -5852,10 +5693,209 @@
               <a:rPr lang="en-US" altLang="ja-JP" sz="4000" dirty="0" smtClean="0"/>
               <a:t>Integrative analysis with DNA and RNA sequence data (e.g., detecting somatic mutation causing splicing change) is coming soon!!</a:t>
             </a:r>
-            <a:endParaRPr lang="en-US" altLang="ja-JP" sz="4000" dirty="0" smtClean="0"/>
-          </a:p>
-        </p:txBody>
-      </p:sp>
+          </a:p>
+        </p:txBody>
+      </p:sp>
+      <p:sp>
+        <p:nvSpPr>
+          <p:cNvPr id="40" name="テキスト ボックス 39"/>
+          <p:cNvSpPr txBox="1"/>
+          <p:nvPr/>
+        </p:nvSpPr>
+        <p:spPr>
+          <a:xfrm>
+            <a:off x="1620405" y="22321936"/>
+            <a:ext cx="8424936" cy="646331"/>
+          </a:xfrm>
+          <a:prstGeom prst="rect">
+            <a:avLst/>
+          </a:prstGeom>
+          <a:solidFill>
+            <a:schemeClr val="bg1">
+              <a:lumMod val="95000"/>
+            </a:schemeClr>
+          </a:solidFill>
+        </p:spPr>
+        <p:txBody>
+          <a:bodyPr wrap="square" rtlCol="0">
+            <a:spAutoFit/>
+          </a:bodyPr>
+          <a:lstStyle/>
+          <a:p>
+            <a:r>
+              <a:rPr lang="en-US" altLang="ja-JP" sz="3600" dirty="0" err="1" smtClean="0"/>
+              <a:t>genomon_pipeline</a:t>
+            </a:r>
+            <a:r>
+              <a:rPr lang="en-US" altLang="ja-JP" sz="3600" dirty="0" smtClean="0"/>
+              <a:t> </a:t>
+            </a:r>
+            <a:r>
+              <a:rPr lang="en-US" altLang="ja-JP" sz="3600" dirty="0" err="1" smtClean="0"/>
+              <a:t>dna</a:t>
+            </a:r>
+            <a:r>
+              <a:rPr lang="en-US" altLang="ja-JP" sz="3600" dirty="0" smtClean="0"/>
+              <a:t> input.csv </a:t>
+            </a:r>
+            <a:r>
+              <a:rPr lang="en-US" altLang="ja-JP" sz="3600" dirty="0" err="1" smtClean="0"/>
+              <a:t>output_dir</a:t>
+            </a:r>
+            <a:endParaRPr kumimoji="1" lang="ja-JP" altLang="en-US" sz="3600" dirty="0"/>
+          </a:p>
+        </p:txBody>
+      </p:sp>
+      <p:pic>
+        <p:nvPicPr>
+          <p:cNvPr id="21" name="図 20"/>
+          <p:cNvPicPr>
+            <a:picLocks noChangeAspect="1"/>
+          </p:cNvPicPr>
+          <p:nvPr/>
+        </p:nvPicPr>
+        <p:blipFill>
+          <a:blip r:embed="rId7">
+            <a:extLst>
+              <a:ext uri="{28A0092B-C50C-407E-A947-70E740481C1C}">
+                <a14:useLocalDpi xmlns:a14="http://schemas.microsoft.com/office/drawing/2010/main" val="0"/>
+              </a:ext>
+            </a:extLst>
+          </a:blip>
+          <a:stretch>
+            <a:fillRect/>
+          </a:stretch>
+        </p:blipFill>
+        <p:spPr>
+          <a:xfrm>
+            <a:off x="25045943" y="16571549"/>
+            <a:ext cx="2438400" cy="2438400"/>
+          </a:xfrm>
+          <a:prstGeom prst="rect">
+            <a:avLst/>
+          </a:prstGeom>
+        </p:spPr>
+      </p:pic>
+      <p:pic>
+        <p:nvPicPr>
+          <p:cNvPr id="22" name="図 21"/>
+          <p:cNvPicPr>
+            <a:picLocks noChangeAspect="1"/>
+          </p:cNvPicPr>
+          <p:nvPr/>
+        </p:nvPicPr>
+        <p:blipFill>
+          <a:blip r:embed="rId8">
+            <a:extLst>
+              <a:ext uri="{28A0092B-C50C-407E-A947-70E740481C1C}">
+                <a14:useLocalDpi xmlns:a14="http://schemas.microsoft.com/office/drawing/2010/main" val="0"/>
+              </a:ext>
+            </a:extLst>
+          </a:blip>
+          <a:stretch>
+            <a:fillRect/>
+          </a:stretch>
+        </p:blipFill>
+        <p:spPr>
+          <a:xfrm>
+            <a:off x="14838809" y="16571549"/>
+            <a:ext cx="2438400" cy="2438400"/>
+          </a:xfrm>
+          <a:prstGeom prst="rect">
+            <a:avLst/>
+          </a:prstGeom>
+        </p:spPr>
+      </p:pic>
+      <p:pic>
+        <p:nvPicPr>
+          <p:cNvPr id="23" name="図 22"/>
+          <p:cNvPicPr>
+            <a:picLocks noChangeAspect="1"/>
+          </p:cNvPicPr>
+          <p:nvPr/>
+        </p:nvPicPr>
+        <p:blipFill>
+          <a:blip r:embed="rId9">
+            <a:extLst>
+              <a:ext uri="{28A0092B-C50C-407E-A947-70E740481C1C}">
+                <a14:useLocalDpi xmlns:a14="http://schemas.microsoft.com/office/drawing/2010/main" val="0"/>
+              </a:ext>
+            </a:extLst>
+          </a:blip>
+          <a:stretch>
+            <a:fillRect/>
+          </a:stretch>
+        </p:blipFill>
+        <p:spPr>
+          <a:xfrm>
+            <a:off x="4631675" y="16571549"/>
+            <a:ext cx="2438400" cy="2438400"/>
+          </a:xfrm>
+          <a:prstGeom prst="rect">
+            <a:avLst/>
+          </a:prstGeom>
+        </p:spPr>
+      </p:pic>
+      <p:pic>
+        <p:nvPicPr>
+          <p:cNvPr id="10" name="図 9"/>
+          <p:cNvPicPr>
+            <a:picLocks noChangeAspect="1"/>
+          </p:cNvPicPr>
+          <p:nvPr/>
+        </p:nvPicPr>
+        <p:blipFill>
+          <a:blip r:embed="rId10">
+            <a:extLst>
+              <a:ext uri="{28A0092B-C50C-407E-A947-70E740481C1C}">
+                <a14:useLocalDpi xmlns:a14="http://schemas.microsoft.com/office/drawing/2010/main" val="0"/>
+              </a:ext>
+            </a:extLst>
+          </a:blip>
+          <a:stretch>
+            <a:fillRect/>
+          </a:stretch>
+        </p:blipFill>
+        <p:spPr>
+          <a:xfrm>
+            <a:off x="1728418" y="25615893"/>
+            <a:ext cx="12739248" cy="10532448"/>
+          </a:xfrm>
+          <a:prstGeom prst="rect">
+            <a:avLst/>
+          </a:prstGeom>
+        </p:spPr>
+      </p:pic>
+      <p:pic>
+        <p:nvPicPr>
+          <p:cNvPr id="12" name="図 11"/>
+          <p:cNvPicPr>
+            <a:picLocks noChangeAspect="1"/>
+          </p:cNvPicPr>
+          <p:nvPr/>
+        </p:nvPicPr>
+        <p:blipFill>
+          <a:blip r:embed="rId11">
+            <a:extLst>
+              <a:ext uri="{28A0092B-C50C-407E-A947-70E740481C1C}">
+                <a14:useLocalDpi xmlns:a14="http://schemas.microsoft.com/office/drawing/2010/main" val="0"/>
+              </a:ext>
+            </a:extLst>
+          </a:blip>
+          <a:stretch>
+            <a:fillRect/>
+          </a:stretch>
+        </p:blipFill>
+        <p:spPr>
+          <a:xfrm>
+            <a:off x="17777353" y="25563165"/>
+            <a:ext cx="13275608" cy="5619950"/>
+          </a:xfrm>
+          <a:prstGeom prst="rect">
+            <a:avLst/>
+          </a:prstGeom>
+        </p:spPr>
+      </p:pic>
     </p:spTree>
     <p:extLst>
       <p:ext uri="{BB962C8B-B14F-4D97-AF65-F5344CB8AC3E}">
@@ -5869,7 +5909,7 @@
   <p:timing>
     <p:tnLst>
       <p:par>
-        <p:cTn xmlns:p14="http://schemas.microsoft.com/office/powerpoint/2010/main" id="1" dur="indefinite" restart="never" nodeType="tmRoot"/>
+        <p:cTn id="1" dur="indefinite" restart="never" nodeType="tmRoot"/>
       </p:par>
     </p:tnLst>
   </p:timing>

</xml_diff>